<commit_message>
Updated poster project with pictures
</commit_message>
<xml_diff>
--- a/poster_ml_breakout.pptx
+++ b/poster_ml_breakout.pptx
@@ -240,7 +240,7 @@
               <a:rPr lang="en-US" smtClean="0">
                 <a:latin typeface="Verdana Regular" charset="0"/>
               </a:rPr>
-              <a:t>11/25/2024</a:t>
+              <a:t>11/26/2024</a:t>
             </a:fld>
             <a:endParaRPr lang="en-US" dirty="0">
               <a:latin typeface="Verdana Regular" charset="0"/>
@@ -418,7 +418,7 @@
             <a:fld id="{9CF59EBC-EC05-6B4D-B166-DDFA6A1EDCB6}" type="datetimeFigureOut">
               <a:rPr lang="en-US" smtClean="0"/>
               <a:pPr/>
-              <a:t>11/25/2024</a:t>
+              <a:t>11/26/2024</a:t>
             </a:fld>
             <a:endParaRPr lang="en-US" dirty="0"/>
           </a:p>
@@ -482,38 +482,37 @@
           <a:p>
             <a:pPr lvl="0"/>
             <a:r>
-              <a:rPr lang="en-US" dirty="0" smtClean="0"/>
+              <a:rPr lang="en-US" dirty="0"/>
               <a:t>Click to edit Master text styles</a:t>
             </a:r>
           </a:p>
           <a:p>
             <a:pPr lvl="1"/>
             <a:r>
-              <a:rPr lang="en-US" dirty="0" smtClean="0"/>
+              <a:rPr lang="en-US" dirty="0"/>
               <a:t>Second level</a:t>
             </a:r>
           </a:p>
           <a:p>
             <a:pPr lvl="2"/>
             <a:r>
-              <a:rPr lang="en-US" dirty="0" smtClean="0"/>
+              <a:rPr lang="en-US" dirty="0"/>
               <a:t>Third level</a:t>
             </a:r>
           </a:p>
           <a:p>
             <a:pPr lvl="3"/>
             <a:r>
-              <a:rPr lang="en-US" dirty="0" smtClean="0"/>
+              <a:rPr lang="en-US" dirty="0"/>
               <a:t>Fourth level</a:t>
             </a:r>
           </a:p>
           <a:p>
             <a:pPr lvl="4"/>
             <a:r>
-              <a:rPr lang="en-US" dirty="0" smtClean="0"/>
+              <a:rPr lang="en-US" dirty="0"/>
               <a:t>Fifth level</a:t>
             </a:r>
-            <a:endParaRPr lang="en-US" dirty="0"/>
           </a:p>
         </p:txBody>
       </p:sp>
@@ -1027,18 +1026,13 @@
           </a:lstStyle>
           <a:p>
             <a:r>
-              <a:rPr lang="en-US" sz="5400" cap="none" spc="520" baseline="0" dirty="0" smtClean="0">
+              <a:rPr lang="en-US" sz="5400" cap="none" spc="520" baseline="0" dirty="0">
                 <a:latin typeface="Impact" charset="0"/>
                 <a:ea typeface="Impact" charset="0"/>
                 <a:cs typeface="Impact" charset="0"/>
               </a:rPr>
               <a:t>Electrical Engineering and Computer Science</a:t>
             </a:r>
-            <a:endParaRPr lang="en-US" sz="5400" cap="none" spc="520" baseline="0" dirty="0">
-              <a:latin typeface="Impact" charset="0"/>
-              <a:ea typeface="Impact" charset="0"/>
-              <a:cs typeface="Impact" charset="0"/>
-            </a:endParaRPr>
           </a:p>
         </p:txBody>
       </p:sp>
@@ -1139,18 +1133,13 @@
               </a:spcBef>
             </a:pPr>
             <a:r>
-              <a:rPr lang="en-US" sz="5400" spc="520" baseline="0" dirty="0" smtClean="0">
+              <a:rPr lang="en-US" sz="5400" spc="520" baseline="0" dirty="0">
                 <a:latin typeface="Impact" charset="0"/>
                 <a:ea typeface="Impact" charset="0"/>
                 <a:cs typeface="Impact" charset="0"/>
               </a:rPr>
               <a:t>COLLEGE OF ENGINEERING</a:t>
             </a:r>
-            <a:endParaRPr lang="en-US" sz="5400" spc="520" baseline="0" dirty="0">
-              <a:latin typeface="Impact" charset="0"/>
-              <a:ea typeface="Impact" charset="0"/>
-              <a:cs typeface="Impact" charset="0"/>
-            </a:endParaRPr>
           </a:p>
         </p:txBody>
       </p:sp>
@@ -1542,57 +1531,90 @@
           <a:chExt cx="0" cy="0"/>
         </a:xfrm>
       </p:grpSpPr>
-      <p:sp>
-        <p:nvSpPr>
-          <p:cNvPr id="2" name="Picture Placeholder 1"/>
-          <p:cNvSpPr>
-            <a:spLocks noGrp="1"/>
-          </p:cNvSpPr>
+      <p:pic>
+        <p:nvPicPr>
+          <p:cNvPr id="18" name="Picture Placeholder 17">
+            <a:extLst>
+              <a:ext uri="{FF2B5EF4-FFF2-40B4-BE49-F238E27FC236}">
+                <a16:creationId xmlns:a16="http://schemas.microsoft.com/office/drawing/2014/main" id="{C26AD745-CAD5-D56E-89A8-C57902312F4F}"/>
+              </a:ext>
+            </a:extLst>
+          </p:cNvPr>
+          <p:cNvPicPr>
+            <a:picLocks noGrp="1" noChangeAspect="1"/>
+          </p:cNvPicPr>
           <p:nvPr>
             <p:ph type="pic" sz="quarter" idx="10"/>
           </p:nvPr>
-        </p:nvSpPr>
+        </p:nvPicPr>
+        <p:blipFill>
+          <a:blip r:embed="rId2"/>
+          <a:srcRect l="13699" r="13699"/>
+          <a:stretch/>
+        </p:blipFill>
         <p:spPr>
           <a:xfrm>
-            <a:off x="1931990" y="9583054"/>
-            <a:ext cx="19381645" cy="16497224"/>
+            <a:off x="1931989" y="8243448"/>
+            <a:ext cx="8046394" cy="6620772"/>
           </a:xfrm>
         </p:spPr>
-      </p:sp>
-      <p:sp>
-        <p:nvSpPr>
-          <p:cNvPr id="3" name="Picture Placeholder 2"/>
-          <p:cNvSpPr>
-            <a:spLocks noGrp="1"/>
-          </p:cNvSpPr>
+      </p:pic>
+      <p:pic>
+        <p:nvPicPr>
+          <p:cNvPr id="14" name="Picture Placeholder 13">
+            <a:extLst>
+              <a:ext uri="{FF2B5EF4-FFF2-40B4-BE49-F238E27FC236}">
+                <a16:creationId xmlns:a16="http://schemas.microsoft.com/office/drawing/2014/main" id="{3F0D3A4A-3051-5A48-B5EE-7EE47DC7A135}"/>
+              </a:ext>
+            </a:extLst>
+          </p:cNvPr>
+          <p:cNvPicPr>
+            <a:picLocks noGrp="1" noChangeAspect="1"/>
+          </p:cNvPicPr>
           <p:nvPr>
             <p:ph type="pic" sz="quarter" idx="11"/>
           </p:nvPr>
-        </p:nvSpPr>
+        </p:nvPicPr>
+        <p:blipFill>
+          <a:blip r:embed="rId3"/>
+          <a:srcRect t="19522" b="19522"/>
+          <a:stretch/>
+        </p:blipFill>
         <p:spPr>
           <a:xfrm>
-            <a:off x="22429930" y="20632032"/>
-            <a:ext cx="9080739" cy="9370280"/>
+            <a:off x="22429788" y="20632738"/>
+            <a:ext cx="9080500" cy="9369425"/>
           </a:xfrm>
         </p:spPr>
-      </p:sp>
-      <p:sp>
-        <p:nvSpPr>
-          <p:cNvPr id="4" name="Picture Placeholder 3"/>
-          <p:cNvSpPr>
-            <a:spLocks noGrp="1"/>
-          </p:cNvSpPr>
+      </p:pic>
+      <p:pic>
+        <p:nvPicPr>
+          <p:cNvPr id="16" name="Picture Placeholder 15">
+            <a:extLst>
+              <a:ext uri="{FF2B5EF4-FFF2-40B4-BE49-F238E27FC236}">
+                <a16:creationId xmlns:a16="http://schemas.microsoft.com/office/drawing/2014/main" id="{171C4280-071F-915E-F42B-6389DE83AA6C}"/>
+              </a:ext>
+            </a:extLst>
+          </p:cNvPr>
+          <p:cNvPicPr>
+            <a:picLocks noGrp="1" noChangeAspect="1"/>
+          </p:cNvPicPr>
           <p:nvPr>
             <p:ph type="pic" sz="quarter" idx="12"/>
           </p:nvPr>
-        </p:nvSpPr>
+        </p:nvPicPr>
+        <p:blipFill>
+          <a:blip r:embed="rId4"/>
+          <a:srcRect t="9233" b="9233"/>
+          <a:stretch/>
+        </p:blipFill>
         <p:spPr>
           <a:xfrm>
-            <a:off x="22429930" y="9655781"/>
-            <a:ext cx="19381645" cy="10018964"/>
+            <a:off x="22429788" y="9655175"/>
+            <a:ext cx="19381787" cy="10020300"/>
           </a:xfrm>
         </p:spPr>
-      </p:sp>
+      </p:pic>
       <p:sp>
         <p:nvSpPr>
           <p:cNvPr id="5" name="Text Placeholder 16"/>
@@ -1780,7 +1802,7 @@
           </a:lstStyle>
           <a:p>
             <a:r>
-              <a:rPr lang="en-US" dirty="0" smtClean="0">
+              <a:rPr lang="en-US" dirty="0">
                 <a:solidFill>
                   <a:srgbClr val="E05529"/>
                 </a:solidFill>
@@ -1790,14 +1812,6 @@
               </a:rPr>
               <a:t>Training with ML-Agents</a:t>
             </a:r>
-            <a:endParaRPr lang="en-US" dirty="0">
-              <a:solidFill>
-                <a:srgbClr val="E05529"/>
-              </a:solidFill>
-              <a:latin typeface="Verdana Regular" charset="0"/>
-              <a:ea typeface="Verdana Regular" charset="0"/>
-              <a:cs typeface="Verdana Regular" charset="0"/>
-            </a:endParaRPr>
           </a:p>
         </p:txBody>
       </p:sp>
@@ -1997,7 +2011,7 @@
               </a:spcAft>
             </a:pPr>
             <a:r>
-              <a:rPr lang="en-US" dirty="0" smtClean="0">
+              <a:rPr lang="en-US" dirty="0">
                 <a:latin typeface="Verdana Regular" charset="0"/>
                 <a:ea typeface="Verdana Regular" charset="0"/>
                 <a:cs typeface="Verdana Regular" charset="0"/>
@@ -2012,7 +2026,7 @@
               </a:spcAft>
             </a:pPr>
             <a:r>
-              <a:rPr lang="en-US" dirty="0" smtClean="0">
+              <a:rPr lang="en-US" dirty="0">
                 <a:latin typeface="Verdana Regular" charset="0"/>
                 <a:ea typeface="Verdana Regular" charset="0"/>
                 <a:cs typeface="Verdana Regular" charset="0"/>
@@ -2035,7 +2049,7 @@
               <a:buChar char="•"/>
             </a:pPr>
             <a:r>
-              <a:rPr lang="en-US" dirty="0" smtClean="0">
+              <a:rPr lang="en-US" dirty="0">
                 <a:latin typeface="Verdana Regular" charset="0"/>
                 <a:ea typeface="Verdana Regular" charset="0"/>
                 <a:cs typeface="Verdana Regular" charset="0"/>
@@ -2058,7 +2072,7 @@
               <a:buChar char="•"/>
             </a:pPr>
             <a:r>
-              <a:rPr lang="en-US" dirty="0" smtClean="0">
+              <a:rPr lang="en-US" dirty="0">
                 <a:latin typeface="Verdana Regular" charset="0"/>
                 <a:ea typeface="Verdana Regular" charset="0"/>
                 <a:cs typeface="Verdana Regular" charset="0"/>
@@ -2081,7 +2095,7 @@
               <a:buChar char="•"/>
             </a:pPr>
             <a:r>
-              <a:rPr lang="en-US" dirty="0" smtClean="0">
+              <a:rPr lang="en-US" dirty="0">
                 <a:latin typeface="Verdana Regular" charset="0"/>
                 <a:ea typeface="Verdana Regular" charset="0"/>
                 <a:cs typeface="Verdana Regular" charset="0"/>
@@ -2104,7 +2118,7 @@
               <a:buChar char="•"/>
             </a:pPr>
             <a:r>
-              <a:rPr lang="en-US" dirty="0" smtClean="0">
+              <a:rPr lang="en-US" dirty="0">
                 <a:latin typeface="Verdana Regular" charset="0"/>
                 <a:ea typeface="Verdana Regular" charset="0"/>
                 <a:cs typeface="Verdana Regular" charset="0"/>
@@ -2127,7 +2141,7 @@
               <a:buChar char="•"/>
             </a:pPr>
             <a:r>
-              <a:rPr lang="en-US" dirty="0" smtClean="0">
+              <a:rPr lang="en-US" dirty="0">
                 <a:latin typeface="Verdana Regular" charset="0"/>
                 <a:ea typeface="Verdana Regular" charset="0"/>
                 <a:cs typeface="Verdana Regular" charset="0"/>
@@ -2148,7 +2162,7 @@
               </a:spcAft>
             </a:pPr>
             <a:r>
-              <a:rPr lang="en-US" dirty="0" smtClean="0">
+              <a:rPr lang="en-US" dirty="0">
                 <a:latin typeface="Verdana Regular" charset="0"/>
                 <a:ea typeface="Verdana Regular" charset="0"/>
                 <a:cs typeface="Verdana Regular" charset="0"/>
@@ -2156,7 +2170,7 @@
               <a:t>We set </a:t>
             </a:r>
             <a:r>
-              <a:rPr lang="en-US" dirty="0" err="1" smtClean="0">
+              <a:rPr lang="en-US" dirty="0" err="1">
                 <a:latin typeface="Verdana Regular" charset="0"/>
                 <a:ea typeface="Verdana Regular" charset="0"/>
                 <a:cs typeface="Verdana Regular" charset="0"/>
@@ -2164,7 +2178,7 @@
               <a:t>hyperparameters</a:t>
             </a:r>
             <a:r>
-              <a:rPr lang="en-US" dirty="0" smtClean="0">
+              <a:rPr lang="en-US" dirty="0">
                 <a:latin typeface="Verdana Regular" charset="0"/>
                 <a:ea typeface="Verdana Regular" charset="0"/>
                 <a:cs typeface="Verdana Regular" charset="0"/>
@@ -2172,7 +2186,7 @@
               <a:t> in the related YAML </a:t>
             </a:r>
             <a:r>
-              <a:rPr lang="en-US" dirty="0" err="1" smtClean="0">
+              <a:rPr lang="en-US" dirty="0" err="1">
                 <a:latin typeface="Verdana Regular" charset="0"/>
                 <a:ea typeface="Verdana Regular" charset="0"/>
                 <a:cs typeface="Verdana Regular" charset="0"/>
@@ -2180,7 +2194,7 @@
               <a:t>config</a:t>
             </a:r>
             <a:r>
-              <a:rPr lang="en-US" dirty="0" smtClean="0">
+              <a:rPr lang="en-US" dirty="0">
                 <a:latin typeface="Verdana Regular" charset="0"/>
                 <a:ea typeface="Verdana Regular" charset="0"/>
                 <a:cs typeface="Verdana Regular" charset="0"/>
@@ -2201,7 +2215,7 @@
               </a:spcAft>
             </a:pPr>
             <a:r>
-              <a:rPr lang="en-US" dirty="0" smtClean="0">
+              <a:rPr lang="en-US" dirty="0">
                 <a:latin typeface="Verdana Regular" charset="0"/>
                 <a:ea typeface="Verdana Regular" charset="0"/>
                 <a:cs typeface="Verdana Regular" charset="0"/>
@@ -2222,7 +2236,7 @@
               </a:spcAft>
             </a:pPr>
             <a:r>
-              <a:rPr lang="en-US" dirty="0" smtClean="0">
+              <a:rPr lang="en-US" dirty="0">
                 <a:latin typeface="Verdana Regular" charset="0"/>
                 <a:ea typeface="Verdana Regular" charset="0"/>
                 <a:cs typeface="Verdana Regular" charset="0"/>
@@ -2240,7 +2254,7 @@
               </a:spcAft>
               <a:buNone/>
             </a:pPr>
-            <a:endParaRPr lang="en-US" dirty="0" smtClean="0">
+            <a:endParaRPr lang="en-US" dirty="0">
               <a:latin typeface="Verdana Regular" charset="0"/>
               <a:ea typeface="Verdana Regular" charset="0"/>
               <a:cs typeface="Verdana Regular" charset="0"/>
@@ -2433,18 +2447,13 @@
           </a:lstStyle>
           <a:p>
             <a:r>
-              <a:rPr lang="en-US" sz="7200" dirty="0" smtClean="0">
+              <a:rPr lang="en-US" sz="7200" dirty="0">
                 <a:latin typeface="Georgia" charset="0"/>
                 <a:ea typeface="Georgia" charset="0"/>
                 <a:cs typeface="Georgia" charset="0"/>
               </a:rPr>
               <a:t>A clone of Atari’s Breakout developed with Unity and trained using ML-Agents</a:t>
             </a:r>
-            <a:endParaRPr lang="en-US" sz="7200" dirty="0">
-              <a:latin typeface="Georgia" charset="0"/>
-              <a:ea typeface="Georgia" charset="0"/>
-              <a:cs typeface="Georgia" charset="0"/>
-            </a:endParaRPr>
           </a:p>
         </p:txBody>
       </p:sp>
@@ -2635,7 +2644,7 @@
           </a:lstStyle>
           <a:p>
             <a:r>
-              <a:rPr lang="en-US" dirty="0" smtClean="0">
+              <a:rPr lang="en-US" dirty="0">
                 <a:solidFill>
                   <a:srgbClr val="E05529"/>
                 </a:solidFill>
@@ -2645,14 +2654,6 @@
               </a:rPr>
               <a:t>Breakout</a:t>
             </a:r>
-            <a:endParaRPr lang="en-US" dirty="0">
-              <a:solidFill>
-                <a:srgbClr val="E05529"/>
-              </a:solidFill>
-              <a:latin typeface="Verdana Regular" charset="0"/>
-              <a:ea typeface="Verdana Regular" charset="0"/>
-              <a:cs typeface="Verdana Regular" charset="0"/>
-            </a:endParaRPr>
           </a:p>
         </p:txBody>
       </p:sp>
@@ -2852,7 +2853,7 @@
               </a:spcAft>
             </a:pPr>
             <a:r>
-              <a:rPr lang="en-US" dirty="0" smtClean="0">
+              <a:rPr lang="en-US" dirty="0">
                 <a:latin typeface="Verdana Regular" charset="0"/>
                 <a:ea typeface="Verdana Regular" charset="0"/>
                 <a:cs typeface="Verdana Regular" charset="0"/>
@@ -2860,7 +2861,7 @@
               <a:t>For this project, the team developed a brick-breaking game similar to Atari’s 1976 hit arcade game, </a:t>
             </a:r>
             <a:r>
-              <a:rPr lang="en-US" i="1" dirty="0" smtClean="0">
+              <a:rPr lang="en-US" i="1" dirty="0">
                 <a:latin typeface="Verdana Regular" charset="0"/>
                 <a:ea typeface="Verdana Regular" charset="0"/>
                 <a:cs typeface="Verdana Regular" charset="0"/>
@@ -2868,23 +2869,15 @@
               <a:t>Breakout</a:t>
             </a:r>
             <a:r>
-              <a:rPr lang="en-US" dirty="0" smtClean="0">
+              <a:rPr lang="en-US" dirty="0">
                 <a:latin typeface="Verdana Regular" charset="0"/>
                 <a:ea typeface="Verdana Regular" charset="0"/>
                 <a:cs typeface="Verdana Regular" charset="0"/>
               </a:rPr>
-              <a:t>. </a:t>
+              <a:t>. We used Unity for design and scripting, and the game features a player vs. CPU mode, trained with Unity’s ML-Agent package and associated Python/</a:t>
             </a:r>
             <a:r>
-              <a:rPr lang="en-US" dirty="0" smtClean="0">
-                <a:latin typeface="Verdana Regular" charset="0"/>
-                <a:ea typeface="Verdana Regular" charset="0"/>
-                <a:cs typeface="Verdana Regular" charset="0"/>
-              </a:rPr>
-              <a:t>We used Unity for design and scripting, and the game features a player vs. CPU mode, trained with Unity’s ML-Agent package and associated Python/</a:t>
-            </a:r>
-            <a:r>
-              <a:rPr lang="en-US" dirty="0" err="1" smtClean="0">
+              <a:rPr lang="en-US" dirty="0" err="1">
                 <a:latin typeface="Verdana Regular" charset="0"/>
                 <a:ea typeface="Verdana Regular" charset="0"/>
                 <a:cs typeface="Verdana Regular" charset="0"/>
@@ -2892,18 +2885,13 @@
               <a:t>PyTorch</a:t>
             </a:r>
             <a:r>
-              <a:rPr lang="en-US" dirty="0" smtClean="0">
+              <a:rPr lang="en-US" dirty="0">
                 <a:latin typeface="Verdana Regular" charset="0"/>
                 <a:ea typeface="Verdana Regular" charset="0"/>
                 <a:cs typeface="Verdana Regular" charset="0"/>
               </a:rPr>
               <a:t> toolkit.</a:t>
             </a:r>
-            <a:endParaRPr lang="en-US" dirty="0">
-              <a:latin typeface="Verdana Regular" charset="0"/>
-              <a:ea typeface="Verdana Regular" charset="0"/>
-              <a:cs typeface="Verdana Regular" charset="0"/>
-            </a:endParaRPr>
           </a:p>
         </p:txBody>
       </p:sp>
@@ -2949,7 +2937,7 @@
           </a:lstStyle>
           <a:p>
             <a:r>
-              <a:rPr lang="en-US" b="1" spc="100" dirty="0" smtClean="0">
+              <a:rPr lang="en-US" b="1" spc="100" dirty="0">
                 <a:solidFill>
                   <a:srgbClr val="E05529"/>
                 </a:solidFill>
@@ -2959,14 +2947,6 @@
               </a:rPr>
               <a:t>Machine learning breakout</a:t>
             </a:r>
-            <a:endParaRPr lang="en-US" b="1" spc="100" dirty="0">
-              <a:solidFill>
-                <a:srgbClr val="E05529"/>
-              </a:solidFill>
-              <a:latin typeface="Impact" charset="0"/>
-              <a:ea typeface="Impact" charset="0"/>
-              <a:cs typeface="Impact" charset="0"/>
-            </a:endParaRPr>
           </a:p>
         </p:txBody>
       </p:sp>
@@ -3064,7 +3044,7 @@
           </a:lstStyle>
           <a:p>
             <a:r>
-              <a:rPr lang="en-US" sz="5400" cap="none" spc="100" dirty="0" smtClean="0">
+              <a:rPr lang="en-US" sz="5400" cap="none" spc="100" dirty="0">
                 <a:solidFill>
                   <a:srgbClr val="E05529"/>
                 </a:solidFill>
@@ -3075,7 +3055,7 @@
               <a:t>Chester </a:t>
             </a:r>
             <a:r>
-              <a:rPr lang="en-US" sz="5400" cap="none" spc="100" dirty="0" err="1" smtClean="0">
+              <a:rPr lang="en-US" sz="5400" cap="none" spc="100" dirty="0" err="1">
                 <a:solidFill>
                   <a:srgbClr val="E05529"/>
                 </a:solidFill>
@@ -3094,23 +3074,12 @@
                 <a:ea typeface="Impact" charset="0"/>
                 <a:cs typeface="Impact" charset="0"/>
               </a:rPr>
-              <a:t> </a:t>
+              <a:t>  corpuzc@oregonstate.edu</a:t>
             </a:r>
+          </a:p>
+          <a:p>
             <a:r>
-              <a:rPr lang="en-US" sz="5400" cap="none" spc="100" dirty="0" smtClean="0">
-                <a:solidFill>
-                  <a:srgbClr val="E05529"/>
-                </a:solidFill>
-                <a:latin typeface="+mn-lt"/>
-                <a:ea typeface="Impact" charset="0"/>
-                <a:cs typeface="Impact" charset="0"/>
-              </a:rPr>
-              <a:t> corpuzc@oregonstate.edu</a:t>
-            </a:r>
-          </a:p>
-          <a:p>
-            <a:r>
-              <a:rPr lang="en-US" sz="5400" cap="none" spc="100" dirty="0" smtClean="0">
+              <a:rPr lang="en-US" sz="5400" cap="none" spc="100" dirty="0">
                 <a:solidFill>
                   <a:srgbClr val="E05529"/>
                 </a:solidFill>
@@ -3123,7 +3092,7 @@
           </a:p>
           <a:p>
             <a:r>
-              <a:rPr lang="en-US" sz="5400" cap="none" spc="100" dirty="0" smtClean="0">
+              <a:rPr lang="en-US" sz="5400" cap="none" spc="100" dirty="0">
                 <a:solidFill>
                   <a:srgbClr val="E05529"/>
                 </a:solidFill>
@@ -3134,7 +3103,7 @@
               <a:t>Ben </a:t>
             </a:r>
             <a:r>
-              <a:rPr lang="en-US" sz="5400" cap="none" spc="100" dirty="0" err="1" smtClean="0">
+              <a:rPr lang="en-US" sz="5400" cap="none" spc="100" dirty="0" err="1">
                 <a:solidFill>
                   <a:srgbClr val="E05529"/>
                 </a:solidFill>
@@ -3145,7 +3114,7 @@
               <a:t>Singeltary</a:t>
             </a:r>
             <a:r>
-              <a:rPr lang="en-US" sz="5400" cap="none" spc="100" dirty="0" smtClean="0">
+              <a:rPr lang="en-US" sz="5400" cap="none" spc="100" dirty="0">
                 <a:solidFill>
                   <a:srgbClr val="E05529"/>
                 </a:solidFill>
@@ -3158,7 +3127,7 @@
           </a:p>
           <a:p>
             <a:r>
-              <a:rPr lang="en-US" sz="5400" cap="none" spc="100" dirty="0" smtClean="0">
+              <a:rPr lang="en-US" sz="5400" cap="none" spc="100" dirty="0">
                 <a:solidFill>
                   <a:srgbClr val="E05529"/>
                 </a:solidFill>
@@ -3169,7 +3138,7 @@
               <a:t>Joel </a:t>
             </a:r>
             <a:r>
-              <a:rPr lang="en-US" sz="5400" cap="none" spc="100" dirty="0" err="1" smtClean="0">
+              <a:rPr lang="en-US" sz="5400" cap="none" spc="100" dirty="0" err="1">
                 <a:solidFill>
                   <a:srgbClr val="E05529"/>
                 </a:solidFill>
@@ -3180,7 +3149,7 @@
               <a:t>Vrieze</a:t>
             </a:r>
             <a:r>
-              <a:rPr lang="en-US" sz="5400" cap="none" spc="100" dirty="0" smtClean="0">
+              <a:rPr lang="en-US" sz="5400" cap="none" spc="100" dirty="0">
                 <a:solidFill>
                   <a:srgbClr val="E05529"/>
                 </a:solidFill>
@@ -3192,27 +3161,6 @@
             </a:r>
           </a:p>
           <a:p>
-            <a:endParaRPr lang="en-US" sz="5400" cap="none" spc="100" dirty="0" smtClean="0">
-              <a:solidFill>
-                <a:srgbClr val="E05529"/>
-              </a:solidFill>
-              <a:latin typeface="+mn-lt"/>
-              <a:ea typeface="Impact" charset="0"/>
-              <a:cs typeface="Impact" charset="0"/>
-            </a:endParaRPr>
-          </a:p>
-          <a:p>
-            <a:r>
-              <a:rPr lang="en-US" sz="5400" cap="none" spc="100" dirty="0">
-                <a:solidFill>
-                  <a:srgbClr val="E05529"/>
-                </a:solidFill>
-                <a:latin typeface="+mn-lt"/>
-                <a:ea typeface="Impact" charset="0"/>
-                <a:cs typeface="Impact" charset="0"/>
-              </a:rPr>
-              <a:t>https://github.com/chesterrc/ML-Breakout</a:t>
-            </a:r>
             <a:endParaRPr lang="en-US" sz="5400" cap="none" spc="100" dirty="0">
               <a:solidFill>
                 <a:srgbClr val="E05529"/>
@@ -3222,8 +3170,141 @@
               <a:cs typeface="Impact" charset="0"/>
             </a:endParaRPr>
           </a:p>
+          <a:p>
+            <a:r>
+              <a:rPr lang="en-US" sz="5400" cap="none" spc="100" dirty="0">
+                <a:solidFill>
+                  <a:srgbClr val="E05529"/>
+                </a:solidFill>
+                <a:latin typeface="+mn-lt"/>
+                <a:ea typeface="Impact" charset="0"/>
+                <a:cs typeface="Impact" charset="0"/>
+              </a:rPr>
+              <a:t>https://github.com/chesterrc/ML-Breakout</a:t>
+            </a:r>
+          </a:p>
         </p:txBody>
       </p:sp>
+      <p:pic>
+        <p:nvPicPr>
+          <p:cNvPr id="20" name="Picture 19">
+            <a:extLst>
+              <a:ext uri="{FF2B5EF4-FFF2-40B4-BE49-F238E27FC236}">
+                <a16:creationId xmlns:a16="http://schemas.microsoft.com/office/drawing/2014/main" id="{27997BDB-AF2A-A3A5-814C-84AA3F0AE842}"/>
+              </a:ext>
+            </a:extLst>
+          </p:cNvPr>
+          <p:cNvPicPr>
+            <a:picLocks noChangeAspect="1"/>
+          </p:cNvPicPr>
+          <p:nvPr/>
+        </p:nvPicPr>
+        <p:blipFill>
+          <a:blip r:embed="rId5"/>
+          <a:stretch>
+            <a:fillRect/>
+          </a:stretch>
+        </p:blipFill>
+        <p:spPr>
+          <a:xfrm>
+            <a:off x="1931989" y="15085125"/>
+            <a:ext cx="8046394" cy="4972491"/>
+          </a:xfrm>
+          <a:prstGeom prst="rect">
+            <a:avLst/>
+          </a:prstGeom>
+        </p:spPr>
+      </p:pic>
+      <p:pic>
+        <p:nvPicPr>
+          <p:cNvPr id="22" name="Picture 21">
+            <a:extLst>
+              <a:ext uri="{FF2B5EF4-FFF2-40B4-BE49-F238E27FC236}">
+                <a16:creationId xmlns:a16="http://schemas.microsoft.com/office/drawing/2014/main" id="{C4E9482C-0098-641E-178B-BD8EB86B62F0}"/>
+              </a:ext>
+            </a:extLst>
+          </p:cNvPr>
+          <p:cNvPicPr>
+            <a:picLocks noChangeAspect="1"/>
+          </p:cNvPicPr>
+          <p:nvPr/>
+        </p:nvPicPr>
+        <p:blipFill>
+          <a:blip r:embed="rId6"/>
+          <a:stretch>
+            <a:fillRect/>
+          </a:stretch>
+        </p:blipFill>
+        <p:spPr>
+          <a:xfrm>
+            <a:off x="1972650" y="20278520"/>
+            <a:ext cx="8046394" cy="5117062"/>
+          </a:xfrm>
+          <a:prstGeom prst="rect">
+            <a:avLst/>
+          </a:prstGeom>
+        </p:spPr>
+      </p:pic>
+      <p:pic>
+        <p:nvPicPr>
+          <p:cNvPr id="24" name="Picture 23">
+            <a:extLst>
+              <a:ext uri="{FF2B5EF4-FFF2-40B4-BE49-F238E27FC236}">
+                <a16:creationId xmlns:a16="http://schemas.microsoft.com/office/drawing/2014/main" id="{280B934A-D33D-E8C7-A104-026963C8D0CC}"/>
+              </a:ext>
+            </a:extLst>
+          </p:cNvPr>
+          <p:cNvPicPr>
+            <a:picLocks noChangeAspect="1"/>
+          </p:cNvPicPr>
+          <p:nvPr/>
+        </p:nvPicPr>
+        <p:blipFill>
+          <a:blip r:embed="rId7"/>
+          <a:stretch>
+            <a:fillRect/>
+          </a:stretch>
+        </p:blipFill>
+        <p:spPr>
+          <a:xfrm>
+            <a:off x="10503232" y="16488863"/>
+            <a:ext cx="10466151" cy="7579313"/>
+          </a:xfrm>
+          <a:prstGeom prst="rect">
+            <a:avLst/>
+          </a:prstGeom>
+        </p:spPr>
+      </p:pic>
+      <p:pic>
+        <p:nvPicPr>
+          <p:cNvPr id="28" name="Picture 27">
+            <a:extLst>
+              <a:ext uri="{FF2B5EF4-FFF2-40B4-BE49-F238E27FC236}">
+                <a16:creationId xmlns:a16="http://schemas.microsoft.com/office/drawing/2014/main" id="{E7B734AE-BC82-B7ED-2226-77754539434A}"/>
+              </a:ext>
+            </a:extLst>
+          </p:cNvPr>
+          <p:cNvPicPr>
+            <a:picLocks noChangeAspect="1"/>
+          </p:cNvPicPr>
+          <p:nvPr/>
+        </p:nvPicPr>
+        <p:blipFill>
+          <a:blip r:embed="rId8"/>
+          <a:stretch>
+            <a:fillRect/>
+          </a:stretch>
+        </p:blipFill>
+        <p:spPr>
+          <a:xfrm>
+            <a:off x="10462506" y="9355830"/>
+            <a:ext cx="10506877" cy="6620772"/>
+          </a:xfrm>
+          <a:prstGeom prst="rect">
+            <a:avLst/>
+          </a:prstGeom>
+        </p:spPr>
+      </p:pic>
     </p:spTree>
     <p:extLst>
       <p:ext uri="{BB962C8B-B14F-4D97-AF65-F5344CB8AC3E}">

</xml_diff>

<commit_message>
added some screenshots to PPT
</commit_message>
<xml_diff>
--- a/poster_ml_breakout.pptx
+++ b/poster_ml_breakout.pptx
@@ -240,7 +240,7 @@
               <a:rPr lang="en-US" smtClean="0">
                 <a:latin typeface="Verdana Regular" charset="0"/>
               </a:rPr>
-              <a:t>11/25/2024</a:t>
+              <a:t>11/26/2024</a:t>
             </a:fld>
             <a:endParaRPr lang="en-US" dirty="0">
               <a:latin typeface="Verdana Regular" charset="0"/>
@@ -418,7 +418,7 @@
             <a:fld id="{9CF59EBC-EC05-6B4D-B166-DDFA6A1EDCB6}" type="datetimeFigureOut">
               <a:rPr lang="en-US" smtClean="0"/>
               <a:pPr/>
-              <a:t>11/25/2024</a:t>
+              <a:t>11/26/2024</a:t>
             </a:fld>
             <a:endParaRPr lang="en-US" dirty="0"/>
           </a:p>
@@ -482,38 +482,37 @@
           <a:p>
             <a:pPr lvl="0"/>
             <a:r>
-              <a:rPr lang="en-US" dirty="0" smtClean="0"/>
+              <a:rPr lang="en-US" dirty="0"/>
               <a:t>Click to edit Master text styles</a:t>
             </a:r>
           </a:p>
           <a:p>
             <a:pPr lvl="1"/>
             <a:r>
-              <a:rPr lang="en-US" dirty="0" smtClean="0"/>
+              <a:rPr lang="en-US" dirty="0"/>
               <a:t>Second level</a:t>
             </a:r>
           </a:p>
           <a:p>
             <a:pPr lvl="2"/>
             <a:r>
-              <a:rPr lang="en-US" dirty="0" smtClean="0"/>
+              <a:rPr lang="en-US" dirty="0"/>
               <a:t>Third level</a:t>
             </a:r>
           </a:p>
           <a:p>
             <a:pPr lvl="3"/>
             <a:r>
-              <a:rPr lang="en-US" dirty="0" smtClean="0"/>
+              <a:rPr lang="en-US" dirty="0"/>
               <a:t>Fourth level</a:t>
             </a:r>
           </a:p>
           <a:p>
             <a:pPr lvl="4"/>
             <a:r>
-              <a:rPr lang="en-US" dirty="0" smtClean="0"/>
+              <a:rPr lang="en-US" dirty="0"/>
               <a:t>Fifth level</a:t>
             </a:r>
-            <a:endParaRPr lang="en-US" dirty="0"/>
           </a:p>
         </p:txBody>
       </p:sp>
@@ -1027,18 +1026,13 @@
           </a:lstStyle>
           <a:p>
             <a:r>
-              <a:rPr lang="en-US" sz="5400" cap="none" spc="520" baseline="0" dirty="0" smtClean="0">
+              <a:rPr lang="en-US" sz="5400" cap="none" spc="520" baseline="0" dirty="0">
                 <a:latin typeface="Impact" charset="0"/>
                 <a:ea typeface="Impact" charset="0"/>
                 <a:cs typeface="Impact" charset="0"/>
               </a:rPr>
               <a:t>Electrical Engineering and Computer Science</a:t>
             </a:r>
-            <a:endParaRPr lang="en-US" sz="5400" cap="none" spc="520" baseline="0" dirty="0">
-              <a:latin typeface="Impact" charset="0"/>
-              <a:ea typeface="Impact" charset="0"/>
-              <a:cs typeface="Impact" charset="0"/>
-            </a:endParaRPr>
           </a:p>
         </p:txBody>
       </p:sp>
@@ -1139,18 +1133,13 @@
               </a:spcBef>
             </a:pPr>
             <a:r>
-              <a:rPr lang="en-US" sz="5400" spc="520" baseline="0" dirty="0" smtClean="0">
+              <a:rPr lang="en-US" sz="5400" spc="520" baseline="0" dirty="0">
                 <a:latin typeface="Impact" charset="0"/>
                 <a:ea typeface="Impact" charset="0"/>
                 <a:cs typeface="Impact" charset="0"/>
               </a:rPr>
               <a:t>COLLEGE OF ENGINEERING</a:t>
             </a:r>
-            <a:endParaRPr lang="en-US" sz="5400" spc="520" baseline="0" dirty="0">
-              <a:latin typeface="Impact" charset="0"/>
-              <a:ea typeface="Impact" charset="0"/>
-              <a:cs typeface="Impact" charset="0"/>
-            </a:endParaRPr>
           </a:p>
         </p:txBody>
       </p:sp>
@@ -1544,40 +1533,6 @@
       </p:grpSpPr>
       <p:sp>
         <p:nvSpPr>
-          <p:cNvPr id="2" name="Picture Placeholder 1"/>
-          <p:cNvSpPr>
-            <a:spLocks noGrp="1"/>
-          </p:cNvSpPr>
-          <p:nvPr>
-            <p:ph type="pic" sz="quarter" idx="10"/>
-          </p:nvPr>
-        </p:nvSpPr>
-        <p:spPr>
-          <a:xfrm>
-            <a:off x="1931990" y="9583054"/>
-            <a:ext cx="19381645" cy="16497224"/>
-          </a:xfrm>
-        </p:spPr>
-      </p:sp>
-      <p:sp>
-        <p:nvSpPr>
-          <p:cNvPr id="3" name="Picture Placeholder 2"/>
-          <p:cNvSpPr>
-            <a:spLocks noGrp="1"/>
-          </p:cNvSpPr>
-          <p:nvPr>
-            <p:ph type="pic" sz="quarter" idx="11"/>
-          </p:nvPr>
-        </p:nvSpPr>
-        <p:spPr>
-          <a:xfrm>
-            <a:off x="22429930" y="20632032"/>
-            <a:ext cx="9080739" cy="9370280"/>
-          </a:xfrm>
-        </p:spPr>
-      </p:sp>
-      <p:sp>
-        <p:nvSpPr>
           <p:cNvPr id="4" name="Picture Placeholder 3"/>
           <p:cNvSpPr>
             <a:spLocks noGrp="1"/>
@@ -1592,6 +1547,13 @@
             <a:ext cx="19381645" cy="10018964"/>
           </a:xfrm>
         </p:spPr>
+        <p:txBody>
+          <a:bodyPr/>
+          <a:lstStyle/>
+          <a:p>
+            <a:endParaRPr lang="en-US"/>
+          </a:p>
+        </p:txBody>
       </p:sp>
       <p:sp>
         <p:nvSpPr>
@@ -1780,7 +1742,7 @@
           </a:lstStyle>
           <a:p>
             <a:r>
-              <a:rPr lang="en-US" dirty="0" smtClean="0">
+              <a:rPr lang="en-US" dirty="0">
                 <a:solidFill>
                   <a:srgbClr val="E05529"/>
                 </a:solidFill>
@@ -1790,14 +1752,6 @@
               </a:rPr>
               <a:t>Training with ML-Agents</a:t>
             </a:r>
-            <a:endParaRPr lang="en-US" dirty="0">
-              <a:solidFill>
-                <a:srgbClr val="E05529"/>
-              </a:solidFill>
-              <a:latin typeface="Verdana Regular" charset="0"/>
-              <a:ea typeface="Verdana Regular" charset="0"/>
-              <a:cs typeface="Verdana Regular" charset="0"/>
-            </a:endParaRPr>
           </a:p>
         </p:txBody>
       </p:sp>
@@ -1997,7 +1951,7 @@
               </a:spcAft>
             </a:pPr>
             <a:r>
-              <a:rPr lang="en-US" dirty="0" smtClean="0">
+              <a:rPr lang="en-US" dirty="0">
                 <a:latin typeface="Verdana Regular" charset="0"/>
                 <a:ea typeface="Verdana Regular" charset="0"/>
                 <a:cs typeface="Verdana Regular" charset="0"/>
@@ -2012,7 +1966,7 @@
               </a:spcAft>
             </a:pPr>
             <a:r>
-              <a:rPr lang="en-US" dirty="0" smtClean="0">
+              <a:rPr lang="en-US" dirty="0">
                 <a:latin typeface="Verdana Regular" charset="0"/>
                 <a:ea typeface="Verdana Regular" charset="0"/>
                 <a:cs typeface="Verdana Regular" charset="0"/>
@@ -2035,7 +1989,7 @@
               <a:buChar char="•"/>
             </a:pPr>
             <a:r>
-              <a:rPr lang="en-US" dirty="0" smtClean="0">
+              <a:rPr lang="en-US" dirty="0">
                 <a:latin typeface="Verdana Regular" charset="0"/>
                 <a:ea typeface="Verdana Regular" charset="0"/>
                 <a:cs typeface="Verdana Regular" charset="0"/>
@@ -2058,7 +2012,7 @@
               <a:buChar char="•"/>
             </a:pPr>
             <a:r>
-              <a:rPr lang="en-US" dirty="0" smtClean="0">
+              <a:rPr lang="en-US" dirty="0">
                 <a:latin typeface="Verdana Regular" charset="0"/>
                 <a:ea typeface="Verdana Regular" charset="0"/>
                 <a:cs typeface="Verdana Regular" charset="0"/>
@@ -2081,7 +2035,7 @@
               <a:buChar char="•"/>
             </a:pPr>
             <a:r>
-              <a:rPr lang="en-US" dirty="0" smtClean="0">
+              <a:rPr lang="en-US" dirty="0">
                 <a:latin typeface="Verdana Regular" charset="0"/>
                 <a:ea typeface="Verdana Regular" charset="0"/>
                 <a:cs typeface="Verdana Regular" charset="0"/>
@@ -2104,7 +2058,7 @@
               <a:buChar char="•"/>
             </a:pPr>
             <a:r>
-              <a:rPr lang="en-US" dirty="0" smtClean="0">
+              <a:rPr lang="en-US" dirty="0">
                 <a:latin typeface="Verdana Regular" charset="0"/>
                 <a:ea typeface="Verdana Regular" charset="0"/>
                 <a:cs typeface="Verdana Regular" charset="0"/>
@@ -2127,7 +2081,7 @@
               <a:buChar char="•"/>
             </a:pPr>
             <a:r>
-              <a:rPr lang="en-US" dirty="0" smtClean="0">
+              <a:rPr lang="en-US" dirty="0">
                 <a:latin typeface="Verdana Regular" charset="0"/>
                 <a:ea typeface="Verdana Regular" charset="0"/>
                 <a:cs typeface="Verdana Regular" charset="0"/>
@@ -2148,7 +2102,7 @@
               </a:spcAft>
             </a:pPr>
             <a:r>
-              <a:rPr lang="en-US" dirty="0" smtClean="0">
+              <a:rPr lang="en-US" dirty="0">
                 <a:latin typeface="Verdana Regular" charset="0"/>
                 <a:ea typeface="Verdana Regular" charset="0"/>
                 <a:cs typeface="Verdana Regular" charset="0"/>
@@ -2156,7 +2110,7 @@
               <a:t>We set </a:t>
             </a:r>
             <a:r>
-              <a:rPr lang="en-US" dirty="0" err="1" smtClean="0">
+              <a:rPr lang="en-US" dirty="0" err="1">
                 <a:latin typeface="Verdana Regular" charset="0"/>
                 <a:ea typeface="Verdana Regular" charset="0"/>
                 <a:cs typeface="Verdana Regular" charset="0"/>
@@ -2164,7 +2118,7 @@
               <a:t>hyperparameters</a:t>
             </a:r>
             <a:r>
-              <a:rPr lang="en-US" dirty="0" smtClean="0">
+              <a:rPr lang="en-US" dirty="0">
                 <a:latin typeface="Verdana Regular" charset="0"/>
                 <a:ea typeface="Verdana Regular" charset="0"/>
                 <a:cs typeface="Verdana Regular" charset="0"/>
@@ -2172,7 +2126,7 @@
               <a:t> in the related YAML </a:t>
             </a:r>
             <a:r>
-              <a:rPr lang="en-US" dirty="0" err="1" smtClean="0">
+              <a:rPr lang="en-US" dirty="0" err="1">
                 <a:latin typeface="Verdana Regular" charset="0"/>
                 <a:ea typeface="Verdana Regular" charset="0"/>
                 <a:cs typeface="Verdana Regular" charset="0"/>
@@ -2180,7 +2134,7 @@
               <a:t>config</a:t>
             </a:r>
             <a:r>
-              <a:rPr lang="en-US" dirty="0" smtClean="0">
+              <a:rPr lang="en-US" dirty="0">
                 <a:latin typeface="Verdana Regular" charset="0"/>
                 <a:ea typeface="Verdana Regular" charset="0"/>
                 <a:cs typeface="Verdana Regular" charset="0"/>
@@ -2201,7 +2155,7 @@
               </a:spcAft>
             </a:pPr>
             <a:r>
-              <a:rPr lang="en-US" dirty="0" smtClean="0">
+              <a:rPr lang="en-US" dirty="0">
                 <a:latin typeface="Verdana Regular" charset="0"/>
                 <a:ea typeface="Verdana Regular" charset="0"/>
                 <a:cs typeface="Verdana Regular" charset="0"/>
@@ -2222,7 +2176,7 @@
               </a:spcAft>
             </a:pPr>
             <a:r>
-              <a:rPr lang="en-US" dirty="0" smtClean="0">
+              <a:rPr lang="en-US" dirty="0">
                 <a:latin typeface="Verdana Regular" charset="0"/>
                 <a:ea typeface="Verdana Regular" charset="0"/>
                 <a:cs typeface="Verdana Regular" charset="0"/>
@@ -2240,7 +2194,7 @@
               </a:spcAft>
               <a:buNone/>
             </a:pPr>
-            <a:endParaRPr lang="en-US" dirty="0" smtClean="0">
+            <a:endParaRPr lang="en-US" dirty="0">
               <a:latin typeface="Verdana Regular" charset="0"/>
               <a:ea typeface="Verdana Regular" charset="0"/>
               <a:cs typeface="Verdana Regular" charset="0"/>
@@ -2433,18 +2387,13 @@
           </a:lstStyle>
           <a:p>
             <a:r>
-              <a:rPr lang="en-US" sz="7200" dirty="0" smtClean="0">
+              <a:rPr lang="en-US" sz="7200" dirty="0">
                 <a:latin typeface="Georgia" charset="0"/>
                 <a:ea typeface="Georgia" charset="0"/>
                 <a:cs typeface="Georgia" charset="0"/>
               </a:rPr>
               <a:t>A clone of Atari’s Breakout developed with Unity and trained using ML-Agents</a:t>
             </a:r>
-            <a:endParaRPr lang="en-US" sz="7200" dirty="0">
-              <a:latin typeface="Georgia" charset="0"/>
-              <a:ea typeface="Georgia" charset="0"/>
-              <a:cs typeface="Georgia" charset="0"/>
-            </a:endParaRPr>
           </a:p>
         </p:txBody>
       </p:sp>
@@ -2635,7 +2584,7 @@
           </a:lstStyle>
           <a:p>
             <a:r>
-              <a:rPr lang="en-US" dirty="0" smtClean="0">
+              <a:rPr lang="en-US" dirty="0">
                 <a:solidFill>
                   <a:srgbClr val="E05529"/>
                 </a:solidFill>
@@ -2645,14 +2594,6 @@
               </a:rPr>
               <a:t>Breakout</a:t>
             </a:r>
-            <a:endParaRPr lang="en-US" dirty="0">
-              <a:solidFill>
-                <a:srgbClr val="E05529"/>
-              </a:solidFill>
-              <a:latin typeface="Verdana Regular" charset="0"/>
-              <a:ea typeface="Verdana Regular" charset="0"/>
-              <a:cs typeface="Verdana Regular" charset="0"/>
-            </a:endParaRPr>
           </a:p>
         </p:txBody>
       </p:sp>
@@ -2852,7 +2793,7 @@
               </a:spcAft>
             </a:pPr>
             <a:r>
-              <a:rPr lang="en-US" dirty="0" smtClean="0">
+              <a:rPr lang="en-US" dirty="0">
                 <a:latin typeface="Verdana Regular" charset="0"/>
                 <a:ea typeface="Verdana Regular" charset="0"/>
                 <a:cs typeface="Verdana Regular" charset="0"/>
@@ -2860,7 +2801,7 @@
               <a:t>For this project, the team developed a brick-breaking game similar to Atari’s 1976 hit arcade game, </a:t>
             </a:r>
             <a:r>
-              <a:rPr lang="en-US" i="1" dirty="0" smtClean="0">
+              <a:rPr lang="en-US" i="1" dirty="0">
                 <a:latin typeface="Verdana Regular" charset="0"/>
                 <a:ea typeface="Verdana Regular" charset="0"/>
                 <a:cs typeface="Verdana Regular" charset="0"/>
@@ -2868,23 +2809,15 @@
               <a:t>Breakout</a:t>
             </a:r>
             <a:r>
-              <a:rPr lang="en-US" dirty="0" smtClean="0">
+              <a:rPr lang="en-US" dirty="0">
                 <a:latin typeface="Verdana Regular" charset="0"/>
                 <a:ea typeface="Verdana Regular" charset="0"/>
                 <a:cs typeface="Verdana Regular" charset="0"/>
               </a:rPr>
-              <a:t>. </a:t>
+              <a:t>. We used Unity for design and scripting, and the game features a player vs. CPU mode, trained with Unity’s ML-Agent package and associated Python/</a:t>
             </a:r>
             <a:r>
-              <a:rPr lang="en-US" dirty="0" smtClean="0">
-                <a:latin typeface="Verdana Regular" charset="0"/>
-                <a:ea typeface="Verdana Regular" charset="0"/>
-                <a:cs typeface="Verdana Regular" charset="0"/>
-              </a:rPr>
-              <a:t>We used Unity for design and scripting, and the game features a player vs. CPU mode, trained with Unity’s ML-Agent package and associated Python/</a:t>
-            </a:r>
-            <a:r>
-              <a:rPr lang="en-US" dirty="0" err="1" smtClean="0">
+              <a:rPr lang="en-US" dirty="0" err="1">
                 <a:latin typeface="Verdana Regular" charset="0"/>
                 <a:ea typeface="Verdana Regular" charset="0"/>
                 <a:cs typeface="Verdana Regular" charset="0"/>
@@ -2892,18 +2825,13 @@
               <a:t>PyTorch</a:t>
             </a:r>
             <a:r>
-              <a:rPr lang="en-US" dirty="0" smtClean="0">
+              <a:rPr lang="en-US" dirty="0">
                 <a:latin typeface="Verdana Regular" charset="0"/>
                 <a:ea typeface="Verdana Regular" charset="0"/>
                 <a:cs typeface="Verdana Regular" charset="0"/>
               </a:rPr>
               <a:t> toolkit.</a:t>
             </a:r>
-            <a:endParaRPr lang="en-US" dirty="0">
-              <a:latin typeface="Verdana Regular" charset="0"/>
-              <a:ea typeface="Verdana Regular" charset="0"/>
-              <a:cs typeface="Verdana Regular" charset="0"/>
-            </a:endParaRPr>
           </a:p>
         </p:txBody>
       </p:sp>
@@ -2949,7 +2877,7 @@
           </a:lstStyle>
           <a:p>
             <a:r>
-              <a:rPr lang="en-US" b="1" spc="100" dirty="0" smtClean="0">
+              <a:rPr lang="en-US" b="1" spc="100" dirty="0">
                 <a:solidFill>
                   <a:srgbClr val="E05529"/>
                 </a:solidFill>
@@ -2959,14 +2887,6 @@
               </a:rPr>
               <a:t>Machine learning breakout</a:t>
             </a:r>
-            <a:endParaRPr lang="en-US" b="1" spc="100" dirty="0">
-              <a:solidFill>
-                <a:srgbClr val="E05529"/>
-              </a:solidFill>
-              <a:latin typeface="Impact" charset="0"/>
-              <a:ea typeface="Impact" charset="0"/>
-              <a:cs typeface="Impact" charset="0"/>
-            </a:endParaRPr>
           </a:p>
         </p:txBody>
       </p:sp>
@@ -3064,7 +2984,7 @@
           </a:lstStyle>
           <a:p>
             <a:r>
-              <a:rPr lang="en-US" sz="5400" cap="none" spc="100" dirty="0" smtClean="0">
+              <a:rPr lang="en-US" sz="5400" cap="none" spc="100" dirty="0">
                 <a:solidFill>
                   <a:srgbClr val="E05529"/>
                 </a:solidFill>
@@ -3075,7 +2995,7 @@
               <a:t>Chester </a:t>
             </a:r>
             <a:r>
-              <a:rPr lang="en-US" sz="5400" cap="none" spc="100" dirty="0" err="1" smtClean="0">
+              <a:rPr lang="en-US" sz="5400" cap="none" spc="100" dirty="0" err="1">
                 <a:solidFill>
                   <a:srgbClr val="E05529"/>
                 </a:solidFill>
@@ -3094,23 +3014,12 @@
                 <a:ea typeface="Impact" charset="0"/>
                 <a:cs typeface="Impact" charset="0"/>
               </a:rPr>
-              <a:t> </a:t>
+              <a:t>  corpuzc@oregonstate.edu</a:t>
             </a:r>
+          </a:p>
+          <a:p>
             <a:r>
-              <a:rPr lang="en-US" sz="5400" cap="none" spc="100" dirty="0" smtClean="0">
-                <a:solidFill>
-                  <a:srgbClr val="E05529"/>
-                </a:solidFill>
-                <a:latin typeface="+mn-lt"/>
-                <a:ea typeface="Impact" charset="0"/>
-                <a:cs typeface="Impact" charset="0"/>
-              </a:rPr>
-              <a:t> corpuzc@oregonstate.edu</a:t>
-            </a:r>
-          </a:p>
-          <a:p>
-            <a:r>
-              <a:rPr lang="en-US" sz="5400" cap="none" spc="100" dirty="0" smtClean="0">
+              <a:rPr lang="en-US" sz="5400" cap="none" spc="100" dirty="0">
                 <a:solidFill>
                   <a:srgbClr val="E05529"/>
                 </a:solidFill>
@@ -3123,7 +3032,7 @@
           </a:p>
           <a:p>
             <a:r>
-              <a:rPr lang="en-US" sz="5400" cap="none" spc="100" dirty="0" smtClean="0">
+              <a:rPr lang="en-US" sz="5400" cap="none" spc="100" dirty="0">
                 <a:solidFill>
                   <a:srgbClr val="E05529"/>
                 </a:solidFill>
@@ -3134,7 +3043,7 @@
               <a:t>Ben </a:t>
             </a:r>
             <a:r>
-              <a:rPr lang="en-US" sz="5400" cap="none" spc="100" dirty="0" err="1" smtClean="0">
+              <a:rPr lang="en-US" sz="5400" cap="none" spc="100" dirty="0" err="1">
                 <a:solidFill>
                   <a:srgbClr val="E05529"/>
                 </a:solidFill>
@@ -3145,7 +3054,7 @@
               <a:t>Singeltary</a:t>
             </a:r>
             <a:r>
-              <a:rPr lang="en-US" sz="5400" cap="none" spc="100" dirty="0" smtClean="0">
+              <a:rPr lang="en-US" sz="5400" cap="none" spc="100" dirty="0">
                 <a:solidFill>
                   <a:srgbClr val="E05529"/>
                 </a:solidFill>
@@ -3158,7 +3067,7 @@
           </a:p>
           <a:p>
             <a:r>
-              <a:rPr lang="en-US" sz="5400" cap="none" spc="100" dirty="0" smtClean="0">
+              <a:rPr lang="en-US" sz="5400" cap="none" spc="100" dirty="0">
                 <a:solidFill>
                   <a:srgbClr val="E05529"/>
                 </a:solidFill>
@@ -3169,7 +3078,7 @@
               <a:t>Joel </a:t>
             </a:r>
             <a:r>
-              <a:rPr lang="en-US" sz="5400" cap="none" spc="100" dirty="0" err="1" smtClean="0">
+              <a:rPr lang="en-US" sz="5400" cap="none" spc="100" dirty="0" err="1">
                 <a:solidFill>
                   <a:srgbClr val="E05529"/>
                 </a:solidFill>
@@ -3180,7 +3089,7 @@
               <a:t>Vrieze</a:t>
             </a:r>
             <a:r>
-              <a:rPr lang="en-US" sz="5400" cap="none" spc="100" dirty="0" smtClean="0">
+              <a:rPr lang="en-US" sz="5400" cap="none" spc="100" dirty="0">
                 <a:solidFill>
                   <a:srgbClr val="E05529"/>
                 </a:solidFill>
@@ -3192,27 +3101,6 @@
             </a:r>
           </a:p>
           <a:p>
-            <a:endParaRPr lang="en-US" sz="5400" cap="none" spc="100" dirty="0" smtClean="0">
-              <a:solidFill>
-                <a:srgbClr val="E05529"/>
-              </a:solidFill>
-              <a:latin typeface="+mn-lt"/>
-              <a:ea typeface="Impact" charset="0"/>
-              <a:cs typeface="Impact" charset="0"/>
-            </a:endParaRPr>
-          </a:p>
-          <a:p>
-            <a:r>
-              <a:rPr lang="en-US" sz="5400" cap="none" spc="100" dirty="0">
-                <a:solidFill>
-                  <a:srgbClr val="E05529"/>
-                </a:solidFill>
-                <a:latin typeface="+mn-lt"/>
-                <a:ea typeface="Impact" charset="0"/>
-                <a:cs typeface="Impact" charset="0"/>
-              </a:rPr>
-              <a:t>https://github.com/chesterrc/ML-Breakout</a:t>
-            </a:r>
             <a:endParaRPr lang="en-US" sz="5400" cap="none" spc="100" dirty="0">
               <a:solidFill>
                 <a:srgbClr val="E05529"/>
@@ -3222,8 +3110,125 @@
               <a:cs typeface="Impact" charset="0"/>
             </a:endParaRPr>
           </a:p>
+          <a:p>
+            <a:r>
+              <a:rPr lang="en-US" sz="5400" cap="none" spc="100" dirty="0">
+                <a:solidFill>
+                  <a:srgbClr val="E05529"/>
+                </a:solidFill>
+                <a:latin typeface="+mn-lt"/>
+                <a:ea typeface="Impact" charset="0"/>
+                <a:cs typeface="Impact" charset="0"/>
+              </a:rPr>
+              <a:t>https://github.com/chesterrc/ML-Breakout</a:t>
+            </a:r>
+          </a:p>
         </p:txBody>
       </p:sp>
+      <p:pic>
+        <p:nvPicPr>
+          <p:cNvPr id="14" name="Picture 13">
+            <a:extLst>
+              <a:ext uri="{FF2B5EF4-FFF2-40B4-BE49-F238E27FC236}">
+                <a16:creationId xmlns:a16="http://schemas.microsoft.com/office/drawing/2014/main" id="{1FD2F7A4-D97B-9216-E7B3-A92830DB927E}"/>
+              </a:ext>
+            </a:extLst>
+          </p:cNvPr>
+          <p:cNvPicPr>
+            <a:picLocks noChangeAspect="1"/>
+          </p:cNvPicPr>
+          <p:nvPr/>
+        </p:nvPicPr>
+        <p:blipFill>
+          <a:blip r:embed="rId2"/>
+          <a:stretch>
+            <a:fillRect/>
+          </a:stretch>
+        </p:blipFill>
+        <p:spPr>
+          <a:xfrm>
+            <a:off x="3281223" y="9268319"/>
+            <a:ext cx="16683178" cy="17126694"/>
+          </a:xfrm>
+          <a:prstGeom prst="rect">
+            <a:avLst/>
+          </a:prstGeom>
+        </p:spPr>
+      </p:pic>
+      <p:pic>
+        <p:nvPicPr>
+          <p:cNvPr id="16" name="Picture 15">
+            <a:extLst>
+              <a:ext uri="{FF2B5EF4-FFF2-40B4-BE49-F238E27FC236}">
+                <a16:creationId xmlns:a16="http://schemas.microsoft.com/office/drawing/2014/main" id="{1FE10440-915A-6FF3-BCCC-3B7419869445}"/>
+              </a:ext>
+            </a:extLst>
+          </p:cNvPr>
+          <p:cNvPicPr>
+            <a:picLocks noChangeAspect="1"/>
+          </p:cNvPicPr>
+          <p:nvPr/>
+        </p:nvPicPr>
+        <p:blipFill>
+          <a:blip r:embed="rId3"/>
+          <a:stretch>
+            <a:fillRect/>
+          </a:stretch>
+        </p:blipFill>
+        <p:spPr>
+          <a:xfrm>
+            <a:off x="22285960" y="9595401"/>
+            <a:ext cx="20214590" cy="10139724"/>
+          </a:xfrm>
+          <a:prstGeom prst="rect">
+            <a:avLst/>
+          </a:prstGeom>
+          <a:effectLst>
+            <a:outerShdw blurRad="50800" dist="38100" dir="2700000" algn="tl" rotWithShape="0">
+              <a:prstClr val="black">
+                <a:alpha val="40000"/>
+              </a:prstClr>
+            </a:outerShdw>
+          </a:effectLst>
+        </p:spPr>
+      </p:pic>
+      <p:pic>
+        <p:nvPicPr>
+          <p:cNvPr id="18" name="Picture 17">
+            <a:extLst>
+              <a:ext uri="{FF2B5EF4-FFF2-40B4-BE49-F238E27FC236}">
+                <a16:creationId xmlns:a16="http://schemas.microsoft.com/office/drawing/2014/main" id="{BFDF9A2C-BF9C-5B91-132A-6585EE25F0F1}"/>
+              </a:ext>
+            </a:extLst>
+          </p:cNvPr>
+          <p:cNvPicPr>
+            <a:picLocks noChangeAspect="1"/>
+          </p:cNvPicPr>
+          <p:nvPr/>
+        </p:nvPicPr>
+        <p:blipFill>
+          <a:blip r:embed="rId4"/>
+          <a:stretch>
+            <a:fillRect/>
+          </a:stretch>
+        </p:blipFill>
+        <p:spPr>
+          <a:xfrm>
+            <a:off x="22093499" y="21597659"/>
+            <a:ext cx="9753600" cy="7439025"/>
+          </a:xfrm>
+          <a:prstGeom prst="rect">
+            <a:avLst/>
+          </a:prstGeom>
+          <a:effectLst>
+            <a:outerShdw blurRad="50800" dist="38100" dir="2700000" algn="tl" rotWithShape="0">
+              <a:prstClr val="black">
+                <a:alpha val="40000"/>
+              </a:prstClr>
+            </a:outerShdw>
+          </a:effectLst>
+        </p:spPr>
+      </p:pic>
     </p:spTree>
     <p:extLst>
       <p:ext uri="{BB962C8B-B14F-4D97-AF65-F5344CB8AC3E}">

</xml_diff>